<commit_message>
Copy reservation scripts and pkp
</commit_message>
<xml_diff>
--- a/Description/ResrvationNewSeason.pptx
+++ b/Description/ResrvationNewSeason.pptx
@@ -278,7 +278,7 @@
           <a:p>
             <a:fld id="{DDCE6D58-9B57-4731-A47B-3CD41B48F0A9}" type="datetimeFigureOut">
               <a:rPr lang="de-CH" smtClean="0"/>
-              <a:t>03.06.2025</a:t>
+              <a:t>11.11.2025</a:t>
             </a:fld>
             <a:endParaRPr lang="de-CH"/>
           </a:p>
@@ -448,7 +448,7 @@
           <a:p>
             <a:fld id="{DDCE6D58-9B57-4731-A47B-3CD41B48F0A9}" type="datetimeFigureOut">
               <a:rPr lang="de-CH" smtClean="0"/>
-              <a:t>03.06.2025</a:t>
+              <a:t>11.11.2025</a:t>
             </a:fld>
             <a:endParaRPr lang="de-CH"/>
           </a:p>
@@ -628,7 +628,7 @@
           <a:p>
             <a:fld id="{DDCE6D58-9B57-4731-A47B-3CD41B48F0A9}" type="datetimeFigureOut">
               <a:rPr lang="de-CH" smtClean="0"/>
-              <a:t>03.06.2025</a:t>
+              <a:t>11.11.2025</a:t>
             </a:fld>
             <a:endParaRPr lang="de-CH"/>
           </a:p>
@@ -798,7 +798,7 @@
           <a:p>
             <a:fld id="{DDCE6D58-9B57-4731-A47B-3CD41B48F0A9}" type="datetimeFigureOut">
               <a:rPr lang="de-CH" smtClean="0"/>
-              <a:t>03.06.2025</a:t>
+              <a:t>11.11.2025</a:t>
             </a:fld>
             <a:endParaRPr lang="de-CH"/>
           </a:p>
@@ -1044,7 +1044,7 @@
           <a:p>
             <a:fld id="{DDCE6D58-9B57-4731-A47B-3CD41B48F0A9}" type="datetimeFigureOut">
               <a:rPr lang="de-CH" smtClean="0"/>
-              <a:t>03.06.2025</a:t>
+              <a:t>11.11.2025</a:t>
             </a:fld>
             <a:endParaRPr lang="de-CH"/>
           </a:p>
@@ -1276,7 +1276,7 @@
           <a:p>
             <a:fld id="{DDCE6D58-9B57-4731-A47B-3CD41B48F0A9}" type="datetimeFigureOut">
               <a:rPr lang="de-CH" smtClean="0"/>
-              <a:t>03.06.2025</a:t>
+              <a:t>11.11.2025</a:t>
             </a:fld>
             <a:endParaRPr lang="de-CH"/>
           </a:p>
@@ -1643,7 +1643,7 @@
           <a:p>
             <a:fld id="{DDCE6D58-9B57-4731-A47B-3CD41B48F0A9}" type="datetimeFigureOut">
               <a:rPr lang="de-CH" smtClean="0"/>
-              <a:t>03.06.2025</a:t>
+              <a:t>11.11.2025</a:t>
             </a:fld>
             <a:endParaRPr lang="de-CH"/>
           </a:p>
@@ -1761,7 +1761,7 @@
           <a:p>
             <a:fld id="{DDCE6D58-9B57-4731-A47B-3CD41B48F0A9}" type="datetimeFigureOut">
               <a:rPr lang="de-CH" smtClean="0"/>
-              <a:t>03.06.2025</a:t>
+              <a:t>11.11.2025</a:t>
             </a:fld>
             <a:endParaRPr lang="de-CH"/>
           </a:p>
@@ -1856,7 +1856,7 @@
           <a:p>
             <a:fld id="{DDCE6D58-9B57-4731-A47B-3CD41B48F0A9}" type="datetimeFigureOut">
               <a:rPr lang="de-CH" smtClean="0"/>
-              <a:t>03.06.2025</a:t>
+              <a:t>11.11.2025</a:t>
             </a:fld>
             <a:endParaRPr lang="de-CH"/>
           </a:p>
@@ -2133,7 +2133,7 @@
           <a:p>
             <a:fld id="{DDCE6D58-9B57-4731-A47B-3CD41B48F0A9}" type="datetimeFigureOut">
               <a:rPr lang="de-CH" smtClean="0"/>
-              <a:t>03.06.2025</a:t>
+              <a:t>11.11.2025</a:t>
             </a:fld>
             <a:endParaRPr lang="de-CH"/>
           </a:p>
@@ -2386,7 +2386,7 @@
           <a:p>
             <a:fld id="{DDCE6D58-9B57-4731-A47B-3CD41B48F0A9}" type="datetimeFigureOut">
               <a:rPr lang="de-CH" smtClean="0"/>
-              <a:t>03.06.2025</a:t>
+              <a:t>11.11.2025</a:t>
             </a:fld>
             <a:endParaRPr lang="de-CH"/>
           </a:p>
@@ -2599,7 +2599,7 @@
           <a:p>
             <a:fld id="{DDCE6D58-9B57-4731-A47B-3CD41B48F0A9}" type="datetimeFigureOut">
               <a:rPr lang="de-CH" smtClean="0"/>
-              <a:t>03.06.2025</a:t>
+              <a:t>11.11.2025</a:t>
             </a:fld>
             <a:endParaRPr lang="de-CH"/>
           </a:p>

</xml_diff>